<commit_message>
cleanup of mac specific DS_Store files, carby v1 models added
</commit_message>
<xml_diff>
--- a/Start bulinding 3D models in Studio.pptx
+++ b/Start bulinding 3D models in Studio.pptx
@@ -275,7 +275,7 @@
           <a:p>
             <a:fld id="{D06E0112-6D4A-48E2-B0FF-1478DD7DAD06}" type="datetimeFigureOut">
               <a:rPr lang="en-US" smtClean="0"/>
-              <a:t>11-Sep-19</a:t>
+              <a:t>16-Sep-19</a:t>
             </a:fld>
             <a:endParaRPr lang="en-US"/>
           </a:p>
@@ -473,7 +473,7 @@
           <a:p>
             <a:fld id="{D06E0112-6D4A-48E2-B0FF-1478DD7DAD06}" type="datetimeFigureOut">
               <a:rPr lang="en-US" smtClean="0"/>
-              <a:t>11-Sep-19</a:t>
+              <a:t>16-Sep-19</a:t>
             </a:fld>
             <a:endParaRPr lang="en-US"/>
           </a:p>
@@ -681,7 +681,7 @@
           <a:p>
             <a:fld id="{D06E0112-6D4A-48E2-B0FF-1478DD7DAD06}" type="datetimeFigureOut">
               <a:rPr lang="en-US" smtClean="0"/>
-              <a:t>11-Sep-19</a:t>
+              <a:t>16-Sep-19</a:t>
             </a:fld>
             <a:endParaRPr lang="en-US"/>
           </a:p>
@@ -879,7 +879,7 @@
           <a:p>
             <a:fld id="{D06E0112-6D4A-48E2-B0FF-1478DD7DAD06}" type="datetimeFigureOut">
               <a:rPr lang="en-US" smtClean="0"/>
-              <a:t>11-Sep-19</a:t>
+              <a:t>16-Sep-19</a:t>
             </a:fld>
             <a:endParaRPr lang="en-US"/>
           </a:p>
@@ -1154,7 +1154,7 @@
           <a:p>
             <a:fld id="{D06E0112-6D4A-48E2-B0FF-1478DD7DAD06}" type="datetimeFigureOut">
               <a:rPr lang="en-US" smtClean="0"/>
-              <a:t>11-Sep-19</a:t>
+              <a:t>16-Sep-19</a:t>
             </a:fld>
             <a:endParaRPr lang="en-US"/>
           </a:p>
@@ -1419,7 +1419,7 @@
           <a:p>
             <a:fld id="{D06E0112-6D4A-48E2-B0FF-1478DD7DAD06}" type="datetimeFigureOut">
               <a:rPr lang="en-US" smtClean="0"/>
-              <a:t>11-Sep-19</a:t>
+              <a:t>16-Sep-19</a:t>
             </a:fld>
             <a:endParaRPr lang="en-US"/>
           </a:p>
@@ -1831,7 +1831,7 @@
           <a:p>
             <a:fld id="{D06E0112-6D4A-48E2-B0FF-1478DD7DAD06}" type="datetimeFigureOut">
               <a:rPr lang="en-US" smtClean="0"/>
-              <a:t>11-Sep-19</a:t>
+              <a:t>16-Sep-19</a:t>
             </a:fld>
             <a:endParaRPr lang="en-US"/>
           </a:p>
@@ -1972,7 +1972,7 @@
           <a:p>
             <a:fld id="{D06E0112-6D4A-48E2-B0FF-1478DD7DAD06}" type="datetimeFigureOut">
               <a:rPr lang="en-US" smtClean="0"/>
-              <a:t>11-Sep-19</a:t>
+              <a:t>16-Sep-19</a:t>
             </a:fld>
             <a:endParaRPr lang="en-US"/>
           </a:p>
@@ -2085,7 +2085,7 @@
           <a:p>
             <a:fld id="{D06E0112-6D4A-48E2-B0FF-1478DD7DAD06}" type="datetimeFigureOut">
               <a:rPr lang="en-US" smtClean="0"/>
-              <a:t>11-Sep-19</a:t>
+              <a:t>16-Sep-19</a:t>
             </a:fld>
             <a:endParaRPr lang="en-US"/>
           </a:p>
@@ -2396,7 +2396,7 @@
           <a:p>
             <a:fld id="{D06E0112-6D4A-48E2-B0FF-1478DD7DAD06}" type="datetimeFigureOut">
               <a:rPr lang="en-US" smtClean="0"/>
-              <a:t>11-Sep-19</a:t>
+              <a:t>16-Sep-19</a:t>
             </a:fld>
             <a:endParaRPr lang="en-US"/>
           </a:p>
@@ -2684,7 +2684,7 @@
           <a:p>
             <a:fld id="{D06E0112-6D4A-48E2-B0FF-1478DD7DAD06}" type="datetimeFigureOut">
               <a:rPr lang="en-US" smtClean="0"/>
-              <a:t>11-Sep-19</a:t>
+              <a:t>16-Sep-19</a:t>
             </a:fld>
             <a:endParaRPr lang="en-US"/>
           </a:p>
@@ -2925,7 +2925,7 @@
           <a:p>
             <a:fld id="{D06E0112-6D4A-48E2-B0FF-1478DD7DAD06}" type="datetimeFigureOut">
               <a:rPr lang="en-US" smtClean="0"/>
-              <a:t>11-Sep-19</a:t>
+              <a:t>16-Sep-19</a:t>
             </a:fld>
             <a:endParaRPr lang="en-US"/>
           </a:p>
@@ -5708,7 +5708,9 @@
         </p:nvSpPr>
         <p:spPr/>
         <p:txBody>
-          <a:bodyPr/>
+          <a:bodyPr>
+            <a:normAutofit/>
+          </a:bodyPr>
           <a:lstStyle/>
           <a:p>
             <a:r>
@@ -5719,15 +5721,24 @@
               <a:rPr lang="en-US" dirty="0"/>
             </a:br>
             <a:r>
-              <a:rPr lang="en-US" dirty="0"/>
+              <a:rPr lang="en-US"/>
               <a:t>	</a:t>
+            </a:r>
+            <a:r>
+              <a:rPr lang="en-US">
+                <a:hlinkClick r:id="rId2"/>
+              </a:rPr>
+              <a:t>https</a:t>
             </a:r>
             <a:r>
               <a:rPr lang="en-US" dirty="0">
                 <a:hlinkClick r:id="rId2"/>
               </a:rPr>
-              <a:t>https://drive.google.com/file/d/1EtdtKqdZHvAQjKXpG3DQAwoRQfEWCn5S/view?usp=sharing</a:t>
-            </a:r>
+              <a:t>://drive.google.com/file/d/1FwEy2ncfNYCbKuNuOAqr46er5DSPQw5S/view?usp=sharing</a:t>
+            </a:r>
+            <a:endParaRPr lang="en-US" dirty="0"/>
+          </a:p>
+          <a:p>
             <a:endParaRPr lang="en-US" dirty="0"/>
           </a:p>
           <a:p>

</xml_diff>